<commit_message>
Final version of status update presentation
</commit_message>
<xml_diff>
--- a/WPIn Love, Status Update.pptx
+++ b/WPIn Love, Status Update.pptx
@@ -4,11 +4,20 @@
   <p:sldMasterIdLst>
     <p:sldMasterId id="2147483648" r:id="rId1"/>
   </p:sldMasterIdLst>
+  <p:notesMasterIdLst>
+    <p:notesMasterId r:id="rId12"/>
+  </p:notesMasterIdLst>
   <p:sldIdLst>
     <p:sldId id="256" r:id="rId2"/>
     <p:sldId id="259" r:id="rId3"/>
-    <p:sldId id="257" r:id="rId4"/>
-    <p:sldId id="258" r:id="rId5"/>
+    <p:sldId id="261" r:id="rId4"/>
+    <p:sldId id="265" r:id="rId5"/>
+    <p:sldId id="262" r:id="rId6"/>
+    <p:sldId id="264" r:id="rId7"/>
+    <p:sldId id="266" r:id="rId8"/>
+    <p:sldId id="260" r:id="rId9"/>
+    <p:sldId id="257" r:id="rId10"/>
+    <p:sldId id="258" r:id="rId11"/>
   </p:sldIdLst>
   <p:sldSz cx="9144000" cy="6858000" type="screen4x3"/>
   <p:notesSz cx="6858000" cy="9144000"/>
@@ -1087,6 +1096,13 @@
         </dgm:presLayoutVars>
       </dgm:prSet>
       <dgm:spPr/>
+      <dgm:t>
+        <a:bodyPr/>
+        <a:lstStyle/>
+        <a:p>
+          <a:endParaRPr lang="en-US"/>
+        </a:p>
+      </dgm:t>
     </dgm:pt>
     <dgm:pt modelId="{A98340A3-9700-4ABA-94EE-8E053BF80E8C}" type="pres">
       <dgm:prSet presAssocID="{62921AAD-390F-461D-988B-7F79A5BFFCE8}" presName="node" presStyleLbl="node1" presStyleIdx="0" presStyleCnt="4">
@@ -1166,8 +1182,8 @@
     <dgm:cxn modelId="{E0CE06B8-E146-4E9B-8761-776ACF7280A4}" type="presOf" srcId="{62921AAD-390F-461D-988B-7F79A5BFFCE8}" destId="{A98340A3-9700-4ABA-94EE-8E053BF80E8C}" srcOrd="0" destOrd="0" presId="urn:microsoft.com/office/officeart/2005/8/layout/default"/>
     <dgm:cxn modelId="{681251E0-E3EC-4324-8197-06FF4E71DAD4}" type="presOf" srcId="{9C298825-2F4E-48CC-8D81-41459EC2444C}" destId="{CB0F88C5-799B-45B6-92C1-014356DD4400}" srcOrd="0" destOrd="0" presId="urn:microsoft.com/office/officeart/2005/8/layout/default"/>
     <dgm:cxn modelId="{E416F0B7-0B7E-4636-A9AA-4AD30A0037E4}" srcId="{D4BD2E28-2832-4F23-BB45-57CB43A462A0}" destId="{62921AAD-390F-461D-988B-7F79A5BFFCE8}" srcOrd="0" destOrd="0" parTransId="{5682B17E-227A-4526-889D-2A9EE3C1807B}" sibTransId="{6C0FDE0A-FB25-4BEE-A300-43CDC99E3FF3}"/>
+    <dgm:cxn modelId="{11AE3CE4-9DA8-4B6A-A677-37CD5679CF87}" type="presOf" srcId="{D4BD2E28-2832-4F23-BB45-57CB43A462A0}" destId="{501C6275-C898-4BCB-9B6A-24E476946191}" srcOrd="0" destOrd="0" presId="urn:microsoft.com/office/officeart/2005/8/layout/default"/>
     <dgm:cxn modelId="{127E5C1F-316E-4182-BB07-986DA2D6AA7A}" type="presOf" srcId="{E2F1D017-8C83-4A45-9DBA-96F54B15C3E0}" destId="{14715E35-F3A6-49E3-9FC2-130C39F8C5E4}" srcOrd="0" destOrd="0" presId="urn:microsoft.com/office/officeart/2005/8/layout/default"/>
-    <dgm:cxn modelId="{11AE3CE4-9DA8-4B6A-A677-37CD5679CF87}" type="presOf" srcId="{D4BD2E28-2832-4F23-BB45-57CB43A462A0}" destId="{501C6275-C898-4BCB-9B6A-24E476946191}" srcOrd="0" destOrd="0" presId="urn:microsoft.com/office/officeart/2005/8/layout/default"/>
     <dgm:cxn modelId="{45BBBA67-2BF6-4FF5-ACD2-CA63C02DB375}" srcId="{D4BD2E28-2832-4F23-BB45-57CB43A462A0}" destId="{E2F1D017-8C83-4A45-9DBA-96F54B15C3E0}" srcOrd="1" destOrd="0" parTransId="{44DF9DCB-6702-4AF1-8E96-46BC5162AD57}" sibTransId="{D0C9A02F-9CD5-4BDA-8D68-4FFC414D5219}"/>
     <dgm:cxn modelId="{FBC9EEAF-4605-4DF6-9266-058116D82B8D}" srcId="{D4BD2E28-2832-4F23-BB45-57CB43A462A0}" destId="{9C298825-2F4E-48CC-8D81-41459EC2444C}" srcOrd="3" destOrd="0" parTransId="{F3B7A5A8-4A72-4547-9514-777F42661153}" sibTransId="{953CA826-A4C0-445F-A191-44050370F148}"/>
     <dgm:cxn modelId="{A7BB8F19-4783-4B01-AD3E-C44E27673561}" srcId="{D4BD2E28-2832-4F23-BB45-57CB43A462A0}" destId="{0A5A4520-16CD-49CE-9493-DD3E8E69223F}" srcOrd="2" destOrd="0" parTransId="{231FAB88-733B-4F37-9B94-4DA4CA611A31}" sibTransId="{AEF3608B-7839-4082-A69C-EE72E19B4CE7}"/>
@@ -2794,6 +2810,434 @@
 </dgm:styleDef>
 </file>
 
+<file path=ppt/notesMasters/notesMaster1.xml><?xml version="1.0" encoding="utf-8"?>
+<p:notesMaster xmlns:a="http://schemas.openxmlformats.org/drawingml/2006/main" xmlns:r="http://schemas.openxmlformats.org/officeDocument/2006/relationships" xmlns:p="http://schemas.openxmlformats.org/presentationml/2006/main">
+  <p:cSld>
+    <p:bg>
+      <p:bgRef idx="1001">
+        <a:schemeClr val="bg1"/>
+      </p:bgRef>
+    </p:bg>
+    <p:spTree>
+      <p:nvGrpSpPr>
+        <p:cNvPr id="1" name=""/>
+        <p:cNvGrpSpPr/>
+        <p:nvPr/>
+      </p:nvGrpSpPr>
+      <p:grpSpPr>
+        <a:xfrm>
+          <a:off x="0" y="0"/>
+          <a:ext cx="0" cy="0"/>
+          <a:chOff x="0" y="0"/>
+          <a:chExt cx="0" cy="0"/>
+        </a:xfrm>
+      </p:grpSpPr>
+      <p:sp>
+        <p:nvSpPr>
+          <p:cNvPr id="2" name="Header Placeholder 1"/>
+          <p:cNvSpPr>
+            <a:spLocks noGrp="1"/>
+          </p:cNvSpPr>
+          <p:nvPr>
+            <p:ph type="hdr" sz="quarter"/>
+          </p:nvPr>
+        </p:nvSpPr>
+        <p:spPr>
+          <a:xfrm>
+            <a:off x="0" y="0"/>
+            <a:ext cx="2971800" cy="457200"/>
+          </a:xfrm>
+          <a:prstGeom prst="rect">
+            <a:avLst/>
+          </a:prstGeom>
+        </p:spPr>
+        <p:txBody>
+          <a:bodyPr vert="horz" lIns="91440" tIns="45720" rIns="91440" bIns="45720" rtlCol="0"/>
+          <a:lstStyle>
+            <a:lvl1pPr algn="l">
+              <a:defRPr sz="1200"/>
+            </a:lvl1pPr>
+          </a:lstStyle>
+          <a:p>
+            <a:endParaRPr lang="en-US"/>
+          </a:p>
+        </p:txBody>
+      </p:sp>
+      <p:sp>
+        <p:nvSpPr>
+          <p:cNvPr id="3" name="Date Placeholder 2"/>
+          <p:cNvSpPr>
+            <a:spLocks noGrp="1"/>
+          </p:cNvSpPr>
+          <p:nvPr>
+            <p:ph type="dt" idx="1"/>
+          </p:nvPr>
+        </p:nvSpPr>
+        <p:spPr>
+          <a:xfrm>
+            <a:off x="3884613" y="0"/>
+            <a:ext cx="2971800" cy="457200"/>
+          </a:xfrm>
+          <a:prstGeom prst="rect">
+            <a:avLst/>
+          </a:prstGeom>
+        </p:spPr>
+        <p:txBody>
+          <a:bodyPr vert="horz" lIns="91440" tIns="45720" rIns="91440" bIns="45720" rtlCol="0"/>
+          <a:lstStyle>
+            <a:lvl1pPr algn="r">
+              <a:defRPr sz="1200"/>
+            </a:lvl1pPr>
+          </a:lstStyle>
+          <a:p>
+            <a:fld id="{5F982C7F-4FB8-40C3-8B14-83B7E5C25AA4}" type="datetimeFigureOut">
+              <a:rPr lang="en-US" smtClean="0"/>
+              <a:t>10/1/2015</a:t>
+            </a:fld>
+            <a:endParaRPr lang="en-US"/>
+          </a:p>
+        </p:txBody>
+      </p:sp>
+      <p:sp>
+        <p:nvSpPr>
+          <p:cNvPr id="4" name="Slide Image Placeholder 3"/>
+          <p:cNvSpPr>
+            <a:spLocks noGrp="1" noRot="1" noChangeAspect="1"/>
+          </p:cNvSpPr>
+          <p:nvPr>
+            <p:ph type="sldImg" idx="2"/>
+          </p:nvPr>
+        </p:nvSpPr>
+        <p:spPr>
+          <a:xfrm>
+            <a:off x="1143000" y="685800"/>
+            <a:ext cx="4572000" cy="3429000"/>
+          </a:xfrm>
+          <a:prstGeom prst="rect">
+            <a:avLst/>
+          </a:prstGeom>
+          <a:noFill/>
+          <a:ln w="12700">
+            <a:solidFill>
+              <a:prstClr val="black"/>
+            </a:solidFill>
+          </a:ln>
+        </p:spPr>
+        <p:txBody>
+          <a:bodyPr vert="horz" lIns="91440" tIns="45720" rIns="91440" bIns="45720" rtlCol="0" anchor="ctr"/>
+          <a:lstStyle/>
+          <a:p>
+            <a:endParaRPr lang="en-US"/>
+          </a:p>
+        </p:txBody>
+      </p:sp>
+      <p:sp>
+        <p:nvSpPr>
+          <p:cNvPr id="5" name="Notes Placeholder 4"/>
+          <p:cNvSpPr>
+            <a:spLocks noGrp="1"/>
+          </p:cNvSpPr>
+          <p:nvPr>
+            <p:ph type="body" sz="quarter" idx="3"/>
+          </p:nvPr>
+        </p:nvSpPr>
+        <p:spPr>
+          <a:xfrm>
+            <a:off x="685800" y="4343400"/>
+            <a:ext cx="5486400" cy="4114800"/>
+          </a:xfrm>
+          <a:prstGeom prst="rect">
+            <a:avLst/>
+          </a:prstGeom>
+        </p:spPr>
+        <p:txBody>
+          <a:bodyPr vert="horz" lIns="91440" tIns="45720" rIns="91440" bIns="45720" rtlCol="0">
+            <a:normAutofit/>
+          </a:bodyPr>
+          <a:lstStyle/>
+          <a:p>
+            <a:pPr lvl="0"/>
+            <a:r>
+              <a:rPr lang="en-US" smtClean="0"/>
+              <a:t>Click to edit Master text styles</a:t>
+            </a:r>
+          </a:p>
+          <a:p>
+            <a:pPr lvl="1"/>
+            <a:r>
+              <a:rPr lang="en-US" smtClean="0"/>
+              <a:t>Second level</a:t>
+            </a:r>
+          </a:p>
+          <a:p>
+            <a:pPr lvl="2"/>
+            <a:r>
+              <a:rPr lang="en-US" smtClean="0"/>
+              <a:t>Third level</a:t>
+            </a:r>
+          </a:p>
+          <a:p>
+            <a:pPr lvl="3"/>
+            <a:r>
+              <a:rPr lang="en-US" smtClean="0"/>
+              <a:t>Fourth level</a:t>
+            </a:r>
+          </a:p>
+          <a:p>
+            <a:pPr lvl="4"/>
+            <a:r>
+              <a:rPr lang="en-US" smtClean="0"/>
+              <a:t>Fifth level</a:t>
+            </a:r>
+            <a:endParaRPr lang="en-US"/>
+          </a:p>
+        </p:txBody>
+      </p:sp>
+      <p:sp>
+        <p:nvSpPr>
+          <p:cNvPr id="6" name="Footer Placeholder 5"/>
+          <p:cNvSpPr>
+            <a:spLocks noGrp="1"/>
+          </p:cNvSpPr>
+          <p:nvPr>
+            <p:ph type="ftr" sz="quarter" idx="4"/>
+          </p:nvPr>
+        </p:nvSpPr>
+        <p:spPr>
+          <a:xfrm>
+            <a:off x="0" y="8685213"/>
+            <a:ext cx="2971800" cy="457200"/>
+          </a:xfrm>
+          <a:prstGeom prst="rect">
+            <a:avLst/>
+          </a:prstGeom>
+        </p:spPr>
+        <p:txBody>
+          <a:bodyPr vert="horz" lIns="91440" tIns="45720" rIns="91440" bIns="45720" rtlCol="0" anchor="b"/>
+          <a:lstStyle>
+            <a:lvl1pPr algn="l">
+              <a:defRPr sz="1200"/>
+            </a:lvl1pPr>
+          </a:lstStyle>
+          <a:p>
+            <a:endParaRPr lang="en-US"/>
+          </a:p>
+        </p:txBody>
+      </p:sp>
+      <p:sp>
+        <p:nvSpPr>
+          <p:cNvPr id="7" name="Slide Number Placeholder 6"/>
+          <p:cNvSpPr>
+            <a:spLocks noGrp="1"/>
+          </p:cNvSpPr>
+          <p:nvPr>
+            <p:ph type="sldNum" sz="quarter" idx="5"/>
+          </p:nvPr>
+        </p:nvSpPr>
+        <p:spPr>
+          <a:xfrm>
+            <a:off x="3884613" y="8685213"/>
+            <a:ext cx="2971800" cy="457200"/>
+          </a:xfrm>
+          <a:prstGeom prst="rect">
+            <a:avLst/>
+          </a:prstGeom>
+        </p:spPr>
+        <p:txBody>
+          <a:bodyPr vert="horz" lIns="91440" tIns="45720" rIns="91440" bIns="45720" rtlCol="0" anchor="b"/>
+          <a:lstStyle>
+            <a:lvl1pPr algn="r">
+              <a:defRPr sz="1200"/>
+            </a:lvl1pPr>
+          </a:lstStyle>
+          <a:p>
+            <a:fld id="{FEC87844-D84E-46D3-AB17-761241C088D1}" type="slidenum">
+              <a:rPr lang="en-US" smtClean="0"/>
+              <a:t>‹#›</a:t>
+            </a:fld>
+            <a:endParaRPr lang="en-US"/>
+          </a:p>
+        </p:txBody>
+      </p:sp>
+    </p:spTree>
+  </p:cSld>
+  <p:clrMap bg1="lt1" tx1="dk1" bg2="lt2" tx2="dk2" accent1="accent1" accent2="accent2" accent3="accent3" accent4="accent4" accent5="accent5" accent6="accent6" hlink="hlink" folHlink="folHlink"/>
+  <p:notesStyle>
+    <a:lvl1pPr marL="0" algn="l" defTabSz="914400" rtl="0" eaLnBrk="1" latinLnBrk="0" hangingPunct="1">
+      <a:defRPr sz="1200" kern="1200">
+        <a:solidFill>
+          <a:schemeClr val="tx1"/>
+        </a:solidFill>
+        <a:latin typeface="+mn-lt"/>
+        <a:ea typeface="+mn-ea"/>
+        <a:cs typeface="+mn-cs"/>
+      </a:defRPr>
+    </a:lvl1pPr>
+    <a:lvl2pPr marL="457200" algn="l" defTabSz="914400" rtl="0" eaLnBrk="1" latinLnBrk="0" hangingPunct="1">
+      <a:defRPr sz="1200" kern="1200">
+        <a:solidFill>
+          <a:schemeClr val="tx1"/>
+        </a:solidFill>
+        <a:latin typeface="+mn-lt"/>
+        <a:ea typeface="+mn-ea"/>
+        <a:cs typeface="+mn-cs"/>
+      </a:defRPr>
+    </a:lvl2pPr>
+    <a:lvl3pPr marL="914400" algn="l" defTabSz="914400" rtl="0" eaLnBrk="1" latinLnBrk="0" hangingPunct="1">
+      <a:defRPr sz="1200" kern="1200">
+        <a:solidFill>
+          <a:schemeClr val="tx1"/>
+        </a:solidFill>
+        <a:latin typeface="+mn-lt"/>
+        <a:ea typeface="+mn-ea"/>
+        <a:cs typeface="+mn-cs"/>
+      </a:defRPr>
+    </a:lvl3pPr>
+    <a:lvl4pPr marL="1371600" algn="l" defTabSz="914400" rtl="0" eaLnBrk="1" latinLnBrk="0" hangingPunct="1">
+      <a:defRPr sz="1200" kern="1200">
+        <a:solidFill>
+          <a:schemeClr val="tx1"/>
+        </a:solidFill>
+        <a:latin typeface="+mn-lt"/>
+        <a:ea typeface="+mn-ea"/>
+        <a:cs typeface="+mn-cs"/>
+      </a:defRPr>
+    </a:lvl4pPr>
+    <a:lvl5pPr marL="1828800" algn="l" defTabSz="914400" rtl="0" eaLnBrk="1" latinLnBrk="0" hangingPunct="1">
+      <a:defRPr sz="1200" kern="1200">
+        <a:solidFill>
+          <a:schemeClr val="tx1"/>
+        </a:solidFill>
+        <a:latin typeface="+mn-lt"/>
+        <a:ea typeface="+mn-ea"/>
+        <a:cs typeface="+mn-cs"/>
+      </a:defRPr>
+    </a:lvl5pPr>
+    <a:lvl6pPr marL="2286000" algn="l" defTabSz="914400" rtl="0" eaLnBrk="1" latinLnBrk="0" hangingPunct="1">
+      <a:defRPr sz="1200" kern="1200">
+        <a:solidFill>
+          <a:schemeClr val="tx1"/>
+        </a:solidFill>
+        <a:latin typeface="+mn-lt"/>
+        <a:ea typeface="+mn-ea"/>
+        <a:cs typeface="+mn-cs"/>
+      </a:defRPr>
+    </a:lvl6pPr>
+    <a:lvl7pPr marL="2743200" algn="l" defTabSz="914400" rtl="0" eaLnBrk="1" latinLnBrk="0" hangingPunct="1">
+      <a:defRPr sz="1200" kern="1200">
+        <a:solidFill>
+          <a:schemeClr val="tx1"/>
+        </a:solidFill>
+        <a:latin typeface="+mn-lt"/>
+        <a:ea typeface="+mn-ea"/>
+        <a:cs typeface="+mn-cs"/>
+      </a:defRPr>
+    </a:lvl7pPr>
+    <a:lvl8pPr marL="3200400" algn="l" defTabSz="914400" rtl="0" eaLnBrk="1" latinLnBrk="0" hangingPunct="1">
+      <a:defRPr sz="1200" kern="1200">
+        <a:solidFill>
+          <a:schemeClr val="tx1"/>
+        </a:solidFill>
+        <a:latin typeface="+mn-lt"/>
+        <a:ea typeface="+mn-ea"/>
+        <a:cs typeface="+mn-cs"/>
+      </a:defRPr>
+    </a:lvl8pPr>
+    <a:lvl9pPr marL="3657600" algn="l" defTabSz="914400" rtl="0" eaLnBrk="1" latinLnBrk="0" hangingPunct="1">
+      <a:defRPr sz="1200" kern="1200">
+        <a:solidFill>
+          <a:schemeClr val="tx1"/>
+        </a:solidFill>
+        <a:latin typeface="+mn-lt"/>
+        <a:ea typeface="+mn-ea"/>
+        <a:cs typeface="+mn-cs"/>
+      </a:defRPr>
+    </a:lvl9pPr>
+  </p:notesStyle>
+</p:notesMaster>
+</file>
+
+<file path=ppt/notesSlides/notesSlide1.xml><?xml version="1.0" encoding="utf-8"?>
+<p:notes xmlns:a="http://schemas.openxmlformats.org/drawingml/2006/main" xmlns:r="http://schemas.openxmlformats.org/officeDocument/2006/relationships" xmlns:p="http://schemas.openxmlformats.org/presentationml/2006/main">
+  <p:cSld>
+    <p:spTree>
+      <p:nvGrpSpPr>
+        <p:cNvPr id="1" name=""/>
+        <p:cNvGrpSpPr/>
+        <p:nvPr/>
+      </p:nvGrpSpPr>
+      <p:grpSpPr>
+        <a:xfrm>
+          <a:off x="0" y="0"/>
+          <a:ext cx="0" cy="0"/>
+          <a:chOff x="0" y="0"/>
+          <a:chExt cx="0" cy="0"/>
+        </a:xfrm>
+      </p:grpSpPr>
+      <p:sp>
+        <p:nvSpPr>
+          <p:cNvPr id="2" name="Slide Image Placeholder 1"/>
+          <p:cNvSpPr>
+            <a:spLocks noGrp="1" noRot="1" noChangeAspect="1"/>
+          </p:cNvSpPr>
+          <p:nvPr>
+            <p:ph type="sldImg"/>
+          </p:nvPr>
+        </p:nvSpPr>
+        <p:spPr/>
+      </p:sp>
+      <p:sp>
+        <p:nvSpPr>
+          <p:cNvPr id="3" name="Notes Placeholder 2"/>
+          <p:cNvSpPr>
+            <a:spLocks noGrp="1"/>
+          </p:cNvSpPr>
+          <p:nvPr>
+            <p:ph type="body" idx="1"/>
+          </p:nvPr>
+        </p:nvSpPr>
+        <p:spPr/>
+        <p:txBody>
+          <a:bodyPr>
+            <a:normAutofit/>
+          </a:bodyPr>
+          <a:lstStyle/>
+          <a:p>
+            <a:endParaRPr lang="en-US" dirty="0"/>
+          </a:p>
+        </p:txBody>
+      </p:sp>
+      <p:sp>
+        <p:nvSpPr>
+          <p:cNvPr id="4" name="Slide Number Placeholder 3"/>
+          <p:cNvSpPr>
+            <a:spLocks noGrp="1"/>
+          </p:cNvSpPr>
+          <p:nvPr>
+            <p:ph type="sldNum" sz="quarter" idx="10"/>
+          </p:nvPr>
+        </p:nvSpPr>
+        <p:spPr/>
+        <p:txBody>
+          <a:bodyPr/>
+          <a:lstStyle/>
+          <a:p>
+            <a:fld id="{FEC87844-D84E-46D3-AB17-761241C088D1}" type="slidenum">
+              <a:rPr lang="en-US" smtClean="0"/>
+              <a:t>7</a:t>
+            </a:fld>
+            <a:endParaRPr lang="en-US"/>
+          </a:p>
+        </p:txBody>
+      </p:sp>
+    </p:spTree>
+  </p:cSld>
+  <p:clrMapOvr>
+    <a:masterClrMapping/>
+  </p:clrMapOvr>
+</p:notes>
+</file>
+
 <file path=ppt/slideLayouts/slideLayout1.xml><?xml version="1.0" encoding="utf-8"?>
 <p:sldLayout xmlns:a="http://schemas.openxmlformats.org/drawingml/2006/main" xmlns:r="http://schemas.openxmlformats.org/officeDocument/2006/relationships" xmlns:p="http://schemas.openxmlformats.org/presentationml/2006/main" type="title" preserve="1">
   <p:cSld name="Title Slide">
@@ -2975,7 +3419,8 @@
           <a:p>
             <a:fld id="{524F5913-F03F-4B5F-924E-11C8A4F9FF3F}" type="datetimeFigureOut">
               <a:rPr lang="en-US" smtClean="0"/>
-              <a:t>9/30/2015</a:t>
+              <a:pPr/>
+              <a:t>10/1/2015</a:t>
             </a:fld>
             <a:endParaRPr lang="en-US"/>
           </a:p>
@@ -3017,6 +3462,7 @@
           <a:p>
             <a:fld id="{68E05824-646C-42CB-B512-B847399CEED1}" type="slidenum">
               <a:rPr lang="en-US" smtClean="0"/>
+              <a:pPr/>
               <a:t>‹#›</a:t>
             </a:fld>
             <a:endParaRPr lang="en-US"/>
@@ -3140,7 +3586,8 @@
           <a:p>
             <a:fld id="{524F5913-F03F-4B5F-924E-11C8A4F9FF3F}" type="datetimeFigureOut">
               <a:rPr lang="en-US" smtClean="0"/>
-              <a:t>9/30/2015</a:t>
+              <a:pPr/>
+              <a:t>10/1/2015</a:t>
             </a:fld>
             <a:endParaRPr lang="en-US"/>
           </a:p>
@@ -3182,6 +3629,7 @@
           <a:p>
             <a:fld id="{68E05824-646C-42CB-B512-B847399CEED1}" type="slidenum">
               <a:rPr lang="en-US" smtClean="0"/>
+              <a:pPr/>
               <a:t>‹#›</a:t>
             </a:fld>
             <a:endParaRPr lang="en-US"/>
@@ -3315,7 +3763,8 @@
           <a:p>
             <a:fld id="{524F5913-F03F-4B5F-924E-11C8A4F9FF3F}" type="datetimeFigureOut">
               <a:rPr lang="en-US" smtClean="0"/>
-              <a:t>9/30/2015</a:t>
+              <a:pPr/>
+              <a:t>10/1/2015</a:t>
             </a:fld>
             <a:endParaRPr lang="en-US"/>
           </a:p>
@@ -3357,6 +3806,7 @@
           <a:p>
             <a:fld id="{68E05824-646C-42CB-B512-B847399CEED1}" type="slidenum">
               <a:rPr lang="en-US" smtClean="0"/>
+              <a:pPr/>
               <a:t>‹#›</a:t>
             </a:fld>
             <a:endParaRPr lang="en-US"/>
@@ -3480,7 +3930,8 @@
           <a:p>
             <a:fld id="{524F5913-F03F-4B5F-924E-11C8A4F9FF3F}" type="datetimeFigureOut">
               <a:rPr lang="en-US" smtClean="0"/>
-              <a:t>9/30/2015</a:t>
+              <a:pPr/>
+              <a:t>10/1/2015</a:t>
             </a:fld>
             <a:endParaRPr lang="en-US"/>
           </a:p>
@@ -3522,6 +3973,7 @@
           <a:p>
             <a:fld id="{68E05824-646C-42CB-B512-B847399CEED1}" type="slidenum">
               <a:rPr lang="en-US" smtClean="0"/>
+              <a:pPr/>
               <a:t>‹#›</a:t>
             </a:fld>
             <a:endParaRPr lang="en-US"/>
@@ -3721,7 +4173,8 @@
           <a:p>
             <a:fld id="{524F5913-F03F-4B5F-924E-11C8A4F9FF3F}" type="datetimeFigureOut">
               <a:rPr lang="en-US" smtClean="0"/>
-              <a:t>9/30/2015</a:t>
+              <a:pPr/>
+              <a:t>10/1/2015</a:t>
             </a:fld>
             <a:endParaRPr lang="en-US"/>
           </a:p>
@@ -3763,6 +4216,7 @@
           <a:p>
             <a:fld id="{68E05824-646C-42CB-B512-B847399CEED1}" type="slidenum">
               <a:rPr lang="en-US" smtClean="0"/>
+              <a:pPr/>
               <a:t>‹#›</a:t>
             </a:fld>
             <a:endParaRPr lang="en-US"/>
@@ -4004,7 +4458,8 @@
           <a:p>
             <a:fld id="{524F5913-F03F-4B5F-924E-11C8A4F9FF3F}" type="datetimeFigureOut">
               <a:rPr lang="en-US" smtClean="0"/>
-              <a:t>9/30/2015</a:t>
+              <a:pPr/>
+              <a:t>10/1/2015</a:t>
             </a:fld>
             <a:endParaRPr lang="en-US"/>
           </a:p>
@@ -4046,6 +4501,7 @@
           <a:p>
             <a:fld id="{68E05824-646C-42CB-B512-B847399CEED1}" type="slidenum">
               <a:rPr lang="en-US" smtClean="0"/>
+              <a:pPr/>
               <a:t>‹#›</a:t>
             </a:fld>
             <a:endParaRPr lang="en-US"/>
@@ -4421,7 +4877,8 @@
           <a:p>
             <a:fld id="{524F5913-F03F-4B5F-924E-11C8A4F9FF3F}" type="datetimeFigureOut">
               <a:rPr lang="en-US" smtClean="0"/>
-              <a:t>9/30/2015</a:t>
+              <a:pPr/>
+              <a:t>10/1/2015</a:t>
             </a:fld>
             <a:endParaRPr lang="en-US"/>
           </a:p>
@@ -4463,6 +4920,7 @@
           <a:p>
             <a:fld id="{68E05824-646C-42CB-B512-B847399CEED1}" type="slidenum">
               <a:rPr lang="en-US" smtClean="0"/>
+              <a:pPr/>
               <a:t>‹#›</a:t>
             </a:fld>
             <a:endParaRPr lang="en-US"/>
@@ -4534,7 +4992,8 @@
           <a:p>
             <a:fld id="{524F5913-F03F-4B5F-924E-11C8A4F9FF3F}" type="datetimeFigureOut">
               <a:rPr lang="en-US" smtClean="0"/>
-              <a:t>9/30/2015</a:t>
+              <a:pPr/>
+              <a:t>10/1/2015</a:t>
             </a:fld>
             <a:endParaRPr lang="en-US"/>
           </a:p>
@@ -4576,6 +5035,7 @@
           <a:p>
             <a:fld id="{68E05824-646C-42CB-B512-B847399CEED1}" type="slidenum">
               <a:rPr lang="en-US" smtClean="0"/>
+              <a:pPr/>
               <a:t>‹#›</a:t>
             </a:fld>
             <a:endParaRPr lang="en-US"/>
@@ -4624,7 +5084,8 @@
           <a:p>
             <a:fld id="{524F5913-F03F-4B5F-924E-11C8A4F9FF3F}" type="datetimeFigureOut">
               <a:rPr lang="en-US" smtClean="0"/>
-              <a:t>9/30/2015</a:t>
+              <a:pPr/>
+              <a:t>10/1/2015</a:t>
             </a:fld>
             <a:endParaRPr lang="en-US"/>
           </a:p>
@@ -4666,6 +5127,7 @@
           <a:p>
             <a:fld id="{68E05824-646C-42CB-B512-B847399CEED1}" type="slidenum">
               <a:rPr lang="en-US" smtClean="0"/>
+              <a:pPr/>
               <a:t>‹#›</a:t>
             </a:fld>
             <a:endParaRPr lang="en-US"/>
@@ -4896,7 +5358,8 @@
           <a:p>
             <a:fld id="{524F5913-F03F-4B5F-924E-11C8A4F9FF3F}" type="datetimeFigureOut">
               <a:rPr lang="en-US" smtClean="0"/>
-              <a:t>9/30/2015</a:t>
+              <a:pPr/>
+              <a:t>10/1/2015</a:t>
             </a:fld>
             <a:endParaRPr lang="en-US"/>
           </a:p>
@@ -4938,6 +5401,7 @@
           <a:p>
             <a:fld id="{68E05824-646C-42CB-B512-B847399CEED1}" type="slidenum">
               <a:rPr lang="en-US" smtClean="0"/>
+              <a:pPr/>
               <a:t>‹#›</a:t>
             </a:fld>
             <a:endParaRPr lang="en-US"/>
@@ -5144,7 +5608,8 @@
           <a:p>
             <a:fld id="{524F5913-F03F-4B5F-924E-11C8A4F9FF3F}" type="datetimeFigureOut">
               <a:rPr lang="en-US" smtClean="0"/>
-              <a:t>9/30/2015</a:t>
+              <a:pPr/>
+              <a:t>10/1/2015</a:t>
             </a:fld>
             <a:endParaRPr lang="en-US"/>
           </a:p>
@@ -5186,6 +5651,7 @@
           <a:p>
             <a:fld id="{68E05824-646C-42CB-B512-B847399CEED1}" type="slidenum">
               <a:rPr lang="en-US" smtClean="0"/>
+              <a:pPr/>
               <a:t>‹#›</a:t>
             </a:fld>
             <a:endParaRPr lang="en-US"/>
@@ -5352,7 +5818,8 @@
           <a:p>
             <a:fld id="{524F5913-F03F-4B5F-924E-11C8A4F9FF3F}" type="datetimeFigureOut">
               <a:rPr lang="en-US" smtClean="0"/>
-              <a:t>9/30/2015</a:t>
+              <a:pPr/>
+              <a:t>10/1/2015</a:t>
             </a:fld>
             <a:endParaRPr lang="en-US"/>
           </a:p>
@@ -5430,6 +5897,7 @@
           <a:p>
             <a:fld id="{68E05824-646C-42CB-B512-B847399CEED1}" type="slidenum">
               <a:rPr lang="en-US" smtClean="0"/>
+              <a:pPr/>
               <a:t>‹#›</a:t>
             </a:fld>
             <a:endParaRPr lang="en-US"/>
@@ -6149,6 +6617,157 @@
 </p:sld>
 </file>
 
+<file path=ppt/slides/slide10.xml><?xml version="1.0" encoding="utf-8"?>
+<p:sld xmlns:a="http://schemas.openxmlformats.org/drawingml/2006/main" xmlns:r="http://schemas.openxmlformats.org/officeDocument/2006/relationships" xmlns:p="http://schemas.openxmlformats.org/presentationml/2006/main">
+  <p:cSld>
+    <p:spTree>
+      <p:nvGrpSpPr>
+        <p:cNvPr id="1" name=""/>
+        <p:cNvGrpSpPr/>
+        <p:nvPr/>
+      </p:nvGrpSpPr>
+      <p:grpSpPr>
+        <a:xfrm>
+          <a:off x="0" y="0"/>
+          <a:ext cx="0" cy="0"/>
+          <a:chOff x="0" y="0"/>
+          <a:chExt cx="0" cy="0"/>
+        </a:xfrm>
+      </p:grpSpPr>
+      <p:pic>
+        <p:nvPicPr>
+          <p:cNvPr id="4" name="Picture 2" descr="C:\Users\Craig\Documents\Ayee\Pilot Uncompiled\game\images\tree.jpg"/>
+          <p:cNvPicPr>
+            <a:picLocks noChangeAspect="1" noChangeArrowheads="1"/>
+          </p:cNvPicPr>
+          <p:nvPr/>
+        </p:nvPicPr>
+        <p:blipFill>
+          <a:blip r:embed="rId2" cstate="print">
+            <a:duotone>
+              <a:schemeClr val="bg2">
+                <a:shade val="45000"/>
+                <a:satMod val="135000"/>
+              </a:schemeClr>
+              <a:prstClr val="white"/>
+            </a:duotone>
+          </a:blip>
+          <a:srcRect/>
+          <a:stretch>
+            <a:fillRect/>
+          </a:stretch>
+        </p:blipFill>
+        <p:spPr bwMode="auto">
+          <a:xfrm>
+            <a:off x="0" y="0"/>
+            <a:ext cx="9144000" cy="6858000"/>
+          </a:xfrm>
+          <a:prstGeom prst="rect">
+            <a:avLst/>
+          </a:prstGeom>
+          <a:noFill/>
+        </p:spPr>
+      </p:pic>
+      <p:sp>
+        <p:nvSpPr>
+          <p:cNvPr id="2" name="Title 1"/>
+          <p:cNvSpPr>
+            <a:spLocks noGrp="1"/>
+          </p:cNvSpPr>
+          <p:nvPr>
+            <p:ph type="title"/>
+          </p:nvPr>
+        </p:nvSpPr>
+        <p:spPr/>
+        <p:txBody>
+          <a:bodyPr/>
+          <a:lstStyle/>
+          <a:p>
+            <a:r>
+              <a:rPr lang="en-US" dirty="0" smtClean="0"/>
+              <a:t>What to cut?</a:t>
+            </a:r>
+            <a:endParaRPr lang="en-US" dirty="0"/>
+          </a:p>
+        </p:txBody>
+      </p:sp>
+      <p:sp>
+        <p:nvSpPr>
+          <p:cNvPr id="3" name="Content Placeholder 2"/>
+          <p:cNvSpPr>
+            <a:spLocks noGrp="1"/>
+          </p:cNvSpPr>
+          <p:nvPr>
+            <p:ph idx="1"/>
+          </p:nvPr>
+        </p:nvSpPr>
+        <p:spPr/>
+        <p:txBody>
+          <a:bodyPr/>
+          <a:lstStyle/>
+          <a:p>
+            <a:pPr>
+              <a:buNone/>
+            </a:pPr>
+            <a:r>
+              <a:rPr lang="en-US" dirty="0" smtClean="0"/>
+              <a:t>The most dispensable aspects of the game, in order:</a:t>
+            </a:r>
+          </a:p>
+          <a:p>
+            <a:pPr marL="514350" indent="-514350">
+              <a:buFont typeface="+mj-lt"/>
+              <a:buAutoNum type="arabicPeriod"/>
+            </a:pPr>
+            <a:r>
+              <a:rPr lang="en-US" dirty="0" smtClean="0"/>
+              <a:t>Large chunks of dialogue (e.g. professor’s speech, dinner conversation, epilogue)</a:t>
+            </a:r>
+          </a:p>
+          <a:p>
+            <a:pPr marL="514350" indent="-514350">
+              <a:buFont typeface="+mj-lt"/>
+              <a:buAutoNum type="arabicPeriod"/>
+            </a:pPr>
+            <a:r>
+              <a:rPr lang="en-US" dirty="0" smtClean="0"/>
+              <a:t>One emotion asset per character</a:t>
+            </a:r>
+          </a:p>
+          <a:p>
+            <a:pPr marL="514350" indent="-514350">
+              <a:buFont typeface="+mj-lt"/>
+              <a:buAutoNum type="arabicPeriod"/>
+            </a:pPr>
+            <a:r>
+              <a:rPr lang="en-US" dirty="0" smtClean="0"/>
+              <a:t>Scene 3 in its entirety; scene 8 on male side</a:t>
+            </a:r>
+          </a:p>
+          <a:p>
+            <a:pPr marL="514350" indent="-514350">
+              <a:buFont typeface="+mj-lt"/>
+              <a:buAutoNum type="arabicPeriod"/>
+            </a:pPr>
+            <a:endParaRPr lang="en-US" dirty="0"/>
+          </a:p>
+        </p:txBody>
+      </p:sp>
+    </p:spTree>
+  </p:cSld>
+  <p:clrMapOvr>
+    <a:masterClrMapping/>
+  </p:clrMapOvr>
+  <p:timing>
+    <p:tnLst>
+      <p:par>
+        <p:cTn id="1" dur="indefinite" restart="never" nodeType="tmRoot"/>
+      </p:par>
+    </p:tnLst>
+  </p:timing>
+</p:sld>
+</file>
+
 <file path=ppt/slides/slide2.xml><?xml version="1.0" encoding="utf-8"?>
 <p:sld xmlns:a="http://schemas.openxmlformats.org/drawingml/2006/main" xmlns:r="http://schemas.openxmlformats.org/officeDocument/2006/relationships" xmlns:p="http://schemas.openxmlformats.org/presentationml/2006/main">
   <p:cSld>
@@ -6280,22 +6899,14 @@
       </p:grpSpPr>
       <p:pic>
         <p:nvPicPr>
-          <p:cNvPr id="4" name="Picture 2" descr="C:\Users\Craig\Documents\Ayee\Pilot Uncompiled\game\images\tree.jpg"/>
+          <p:cNvPr id="3074" name="Picture 2"/>
           <p:cNvPicPr>
             <a:picLocks noChangeAspect="1" noChangeArrowheads="1"/>
           </p:cNvPicPr>
           <p:nvPr/>
         </p:nvPicPr>
         <p:blipFill>
-          <a:blip r:embed="rId2" cstate="print">
-            <a:duotone>
-              <a:schemeClr val="bg2">
-                <a:shade val="45000"/>
-                <a:satMod val="135000"/>
-              </a:schemeClr>
-              <a:prstClr val="white"/>
-            </a:duotone>
-          </a:blip>
+          <a:blip r:embed="rId2" cstate="print"/>
           <a:srcRect/>
           <a:stretch>
             <a:fillRect/>
@@ -6303,8 +6914,570 @@
         </p:blipFill>
         <p:spPr bwMode="auto">
           <a:xfrm>
-            <a:off x="0" y="0"/>
-            <a:ext cx="9144000" cy="6858000"/>
+            <a:off x="-4763" y="-1588"/>
+            <a:ext cx="9153526" cy="6867526"/>
+          </a:xfrm>
+          <a:prstGeom prst="rect">
+            <a:avLst/>
+          </a:prstGeom>
+          <a:noFill/>
+          <a:ln w="9525">
+            <a:noFill/>
+            <a:miter lim="800000"/>
+            <a:headEnd/>
+            <a:tailEnd/>
+          </a:ln>
+          <a:effectLst/>
+        </p:spPr>
+      </p:pic>
+      <p:sp>
+        <p:nvSpPr>
+          <p:cNvPr id="2" name="Title 1"/>
+          <p:cNvSpPr>
+            <a:spLocks noGrp="1"/>
+          </p:cNvSpPr>
+          <p:nvPr>
+            <p:ph type="title"/>
+          </p:nvPr>
+        </p:nvSpPr>
+        <p:spPr/>
+        <p:txBody>
+          <a:bodyPr/>
+          <a:lstStyle/>
+          <a:p>
+            <a:r>
+              <a:rPr lang="en-US" dirty="0" smtClean="0"/>
+              <a:t>Griffin Cecil, designer</a:t>
+            </a:r>
+            <a:endParaRPr lang="en-US" dirty="0"/>
+          </a:p>
+        </p:txBody>
+      </p:sp>
+      <p:sp>
+        <p:nvSpPr>
+          <p:cNvPr id="3" name="Content Placeholder 2"/>
+          <p:cNvSpPr>
+            <a:spLocks noGrp="1"/>
+          </p:cNvSpPr>
+          <p:nvPr>
+            <p:ph idx="1"/>
+          </p:nvPr>
+        </p:nvSpPr>
+        <p:spPr/>
+        <p:txBody>
+          <a:bodyPr/>
+          <a:lstStyle/>
+          <a:p>
+            <a:r>
+              <a:rPr lang="en-US" dirty="0" smtClean="0"/>
+              <a:t>Lead storyboard designer</a:t>
+            </a:r>
+          </a:p>
+          <a:p>
+            <a:r>
+              <a:rPr lang="en-US" dirty="0" smtClean="0"/>
+              <a:t>Head writer</a:t>
+            </a:r>
+          </a:p>
+          <a:p>
+            <a:r>
+              <a:rPr lang="en-US" dirty="0" smtClean="0"/>
+              <a:t>Testing and Debugging</a:t>
+            </a:r>
+          </a:p>
+        </p:txBody>
+      </p:sp>
+    </p:spTree>
+  </p:cSld>
+  <p:clrMapOvr>
+    <a:masterClrMapping/>
+  </p:clrMapOvr>
+</p:sld>
+</file>
+
+<file path=ppt/slides/slide4.xml><?xml version="1.0" encoding="utf-8"?>
+<p:sld xmlns:a="http://schemas.openxmlformats.org/drawingml/2006/main" xmlns:r="http://schemas.openxmlformats.org/officeDocument/2006/relationships" xmlns:p="http://schemas.openxmlformats.org/presentationml/2006/main">
+  <p:cSld>
+    <p:spTree>
+      <p:nvGrpSpPr>
+        <p:cNvPr id="1" name=""/>
+        <p:cNvGrpSpPr/>
+        <p:nvPr/>
+      </p:nvGrpSpPr>
+      <p:grpSpPr>
+        <a:xfrm>
+          <a:off x="0" y="0"/>
+          <a:ext cx="0" cy="0"/>
+          <a:chOff x="0" y="0"/>
+          <a:chExt cx="0" cy="0"/>
+        </a:xfrm>
+      </p:grpSpPr>
+      <p:pic>
+        <p:nvPicPr>
+          <p:cNvPr id="3074" name="Picture 2"/>
+          <p:cNvPicPr>
+            <a:picLocks noChangeAspect="1" noChangeArrowheads="1"/>
+          </p:cNvPicPr>
+          <p:nvPr/>
+        </p:nvPicPr>
+        <p:blipFill>
+          <a:blip r:embed="rId2" cstate="print"/>
+          <a:srcRect/>
+          <a:stretch>
+            <a:fillRect/>
+          </a:stretch>
+        </p:blipFill>
+        <p:spPr bwMode="auto">
+          <a:xfrm>
+            <a:off x="-4763" y="-1588"/>
+            <a:ext cx="9153526" cy="6867526"/>
+          </a:xfrm>
+          <a:prstGeom prst="rect">
+            <a:avLst/>
+          </a:prstGeom>
+          <a:noFill/>
+          <a:ln w="9525">
+            <a:noFill/>
+            <a:miter lim="800000"/>
+            <a:headEnd/>
+            <a:tailEnd/>
+          </a:ln>
+          <a:effectLst/>
+        </p:spPr>
+      </p:pic>
+      <p:sp>
+        <p:nvSpPr>
+          <p:cNvPr id="2" name="Title 1"/>
+          <p:cNvSpPr>
+            <a:spLocks noGrp="1"/>
+          </p:cNvSpPr>
+          <p:nvPr>
+            <p:ph type="title"/>
+          </p:nvPr>
+        </p:nvSpPr>
+        <p:spPr/>
+        <p:txBody>
+          <a:bodyPr/>
+          <a:lstStyle/>
+          <a:p>
+            <a:r>
+              <a:rPr lang="en-US" dirty="0" smtClean="0"/>
+              <a:t>Jimmy Tran, programmer</a:t>
+            </a:r>
+            <a:endParaRPr lang="en-US" dirty="0"/>
+          </a:p>
+        </p:txBody>
+      </p:sp>
+      <p:sp>
+        <p:nvSpPr>
+          <p:cNvPr id="3" name="Content Placeholder 2"/>
+          <p:cNvSpPr>
+            <a:spLocks noGrp="1"/>
+          </p:cNvSpPr>
+          <p:nvPr>
+            <p:ph idx="1"/>
+          </p:nvPr>
+        </p:nvSpPr>
+        <p:spPr/>
+        <p:txBody>
+          <a:bodyPr/>
+          <a:lstStyle/>
+          <a:p>
+            <a:r>
+              <a:rPr lang="en-US" dirty="0" smtClean="0"/>
+              <a:t>Placeholder</a:t>
+            </a:r>
+          </a:p>
+          <a:p>
+            <a:r>
+              <a:rPr lang="en-US" dirty="0" smtClean="0"/>
+              <a:t>Coding special effects/general aesthetics</a:t>
+            </a:r>
+          </a:p>
+          <a:p>
+            <a:r>
+              <a:rPr lang="en-US" dirty="0" smtClean="0"/>
+              <a:t>Audio</a:t>
+            </a:r>
+          </a:p>
+        </p:txBody>
+      </p:sp>
+    </p:spTree>
+  </p:cSld>
+  <p:clrMapOvr>
+    <a:masterClrMapping/>
+  </p:clrMapOvr>
+</p:sld>
+</file>
+
+<file path=ppt/slides/slide5.xml><?xml version="1.0" encoding="utf-8"?>
+<p:sld xmlns:a="http://schemas.openxmlformats.org/drawingml/2006/main" xmlns:r="http://schemas.openxmlformats.org/officeDocument/2006/relationships" xmlns:p="http://schemas.openxmlformats.org/presentationml/2006/main">
+  <p:cSld>
+    <p:spTree>
+      <p:nvGrpSpPr>
+        <p:cNvPr id="1" name=""/>
+        <p:cNvGrpSpPr/>
+        <p:nvPr/>
+      </p:nvGrpSpPr>
+      <p:grpSpPr>
+        <a:xfrm>
+          <a:off x="0" y="0"/>
+          <a:ext cx="0" cy="0"/>
+          <a:chOff x="0" y="0"/>
+          <a:chExt cx="0" cy="0"/>
+        </a:xfrm>
+      </p:grpSpPr>
+      <p:pic>
+        <p:nvPicPr>
+          <p:cNvPr id="3074" name="Picture 2"/>
+          <p:cNvPicPr>
+            <a:picLocks noChangeAspect="1" noChangeArrowheads="1"/>
+          </p:cNvPicPr>
+          <p:nvPr/>
+        </p:nvPicPr>
+        <p:blipFill>
+          <a:blip r:embed="rId2" cstate="print"/>
+          <a:srcRect/>
+          <a:stretch>
+            <a:fillRect/>
+          </a:stretch>
+        </p:blipFill>
+        <p:spPr bwMode="auto">
+          <a:xfrm>
+            <a:off x="-4763" y="-1588"/>
+            <a:ext cx="9153526" cy="6867526"/>
+          </a:xfrm>
+          <a:prstGeom prst="rect">
+            <a:avLst/>
+          </a:prstGeom>
+          <a:noFill/>
+          <a:ln w="9525">
+            <a:noFill/>
+            <a:miter lim="800000"/>
+            <a:headEnd/>
+            <a:tailEnd/>
+          </a:ln>
+          <a:effectLst/>
+        </p:spPr>
+      </p:pic>
+      <p:sp>
+        <p:nvSpPr>
+          <p:cNvPr id="2" name="Title 1"/>
+          <p:cNvSpPr>
+            <a:spLocks noGrp="1"/>
+          </p:cNvSpPr>
+          <p:nvPr>
+            <p:ph type="title"/>
+          </p:nvPr>
+        </p:nvSpPr>
+        <p:spPr/>
+        <p:txBody>
+          <a:bodyPr>
+            <a:normAutofit fontScale="90000"/>
+          </a:bodyPr>
+          <a:lstStyle/>
+          <a:p>
+            <a:r>
+              <a:rPr lang="en-US" dirty="0" smtClean="0"/>
+              <a:t>Craig </a:t>
+            </a:r>
+            <a:r>
+              <a:rPr lang="en-US" dirty="0" err="1" smtClean="0"/>
+              <a:t>Bursey</a:t>
+            </a:r>
+            <a:r>
+              <a:rPr lang="en-US" dirty="0" smtClean="0"/>
+              <a:t>, secondary programmer/designer</a:t>
+            </a:r>
+            <a:endParaRPr lang="en-US" dirty="0"/>
+          </a:p>
+        </p:txBody>
+      </p:sp>
+      <p:sp>
+        <p:nvSpPr>
+          <p:cNvPr id="3" name="Content Placeholder 2"/>
+          <p:cNvSpPr>
+            <a:spLocks noGrp="1"/>
+          </p:cNvSpPr>
+          <p:nvPr>
+            <p:ph idx="1"/>
+          </p:nvPr>
+        </p:nvSpPr>
+        <p:spPr/>
+        <p:txBody>
+          <a:bodyPr/>
+          <a:lstStyle/>
+          <a:p>
+            <a:r>
+              <a:rPr lang="en-US" dirty="0" smtClean="0"/>
+              <a:t>Adding features</a:t>
+            </a:r>
+          </a:p>
+          <a:p>
+            <a:r>
+              <a:rPr lang="en-US" dirty="0" smtClean="0"/>
+              <a:t>Coding and proofreading script</a:t>
+            </a:r>
+          </a:p>
+          <a:p>
+            <a:r>
+              <a:rPr lang="en-US" dirty="0" smtClean="0"/>
+              <a:t>Testing/debugging</a:t>
+            </a:r>
+          </a:p>
+          <a:p>
+            <a:r>
+              <a:rPr lang="en-US" dirty="0" smtClean="0"/>
+              <a:t>Managing presentations</a:t>
+            </a:r>
+          </a:p>
+          <a:p>
+            <a:endParaRPr lang="en-US" dirty="0"/>
+          </a:p>
+        </p:txBody>
+      </p:sp>
+    </p:spTree>
+  </p:cSld>
+  <p:clrMapOvr>
+    <a:masterClrMapping/>
+  </p:clrMapOvr>
+</p:sld>
+</file>
+
+<file path=ppt/slides/slide6.xml><?xml version="1.0" encoding="utf-8"?>
+<p:sld xmlns:a="http://schemas.openxmlformats.org/drawingml/2006/main" xmlns:r="http://schemas.openxmlformats.org/officeDocument/2006/relationships" xmlns:p="http://schemas.openxmlformats.org/presentationml/2006/main">
+  <p:cSld>
+    <p:spTree>
+      <p:nvGrpSpPr>
+        <p:cNvPr id="1" name=""/>
+        <p:cNvGrpSpPr/>
+        <p:nvPr/>
+      </p:nvGrpSpPr>
+      <p:grpSpPr>
+        <a:xfrm>
+          <a:off x="0" y="0"/>
+          <a:ext cx="0" cy="0"/>
+          <a:chOff x="0" y="0"/>
+          <a:chExt cx="0" cy="0"/>
+        </a:xfrm>
+      </p:grpSpPr>
+      <p:pic>
+        <p:nvPicPr>
+          <p:cNvPr id="3074" name="Picture 2"/>
+          <p:cNvPicPr>
+            <a:picLocks noChangeAspect="1" noChangeArrowheads="1"/>
+          </p:cNvPicPr>
+          <p:nvPr/>
+        </p:nvPicPr>
+        <p:blipFill>
+          <a:blip r:embed="rId2" cstate="print"/>
+          <a:srcRect/>
+          <a:stretch>
+            <a:fillRect/>
+          </a:stretch>
+        </p:blipFill>
+        <p:spPr bwMode="auto">
+          <a:xfrm>
+            <a:off x="-4763" y="-1588"/>
+            <a:ext cx="9153526" cy="6867526"/>
+          </a:xfrm>
+          <a:prstGeom prst="rect">
+            <a:avLst/>
+          </a:prstGeom>
+          <a:noFill/>
+          <a:ln w="9525">
+            <a:noFill/>
+            <a:miter lim="800000"/>
+            <a:headEnd/>
+            <a:tailEnd/>
+          </a:ln>
+          <a:effectLst/>
+        </p:spPr>
+      </p:pic>
+      <p:sp>
+        <p:nvSpPr>
+          <p:cNvPr id="2" name="Title 1"/>
+          <p:cNvSpPr>
+            <a:spLocks noGrp="1"/>
+          </p:cNvSpPr>
+          <p:nvPr>
+            <p:ph type="title"/>
+          </p:nvPr>
+        </p:nvSpPr>
+        <p:spPr/>
+        <p:txBody>
+          <a:bodyPr>
+            <a:normAutofit/>
+          </a:bodyPr>
+          <a:lstStyle/>
+          <a:p>
+            <a:r>
+              <a:rPr lang="en-US" dirty="0" err="1" smtClean="0"/>
+              <a:t>Jonella</a:t>
+            </a:r>
+            <a:r>
+              <a:rPr lang="en-US" dirty="0" smtClean="0"/>
+              <a:t> Esposito, artist</a:t>
+            </a:r>
+            <a:endParaRPr lang="en-US" dirty="0"/>
+          </a:p>
+        </p:txBody>
+      </p:sp>
+      <p:sp>
+        <p:nvSpPr>
+          <p:cNvPr id="3" name="Content Placeholder 2"/>
+          <p:cNvSpPr>
+            <a:spLocks noGrp="1"/>
+          </p:cNvSpPr>
+          <p:nvPr>
+            <p:ph idx="1"/>
+          </p:nvPr>
+        </p:nvSpPr>
+        <p:spPr/>
+        <p:txBody>
+          <a:bodyPr/>
+          <a:lstStyle/>
+          <a:p>
+            <a:r>
+              <a:rPr lang="en-US" dirty="0" smtClean="0"/>
+              <a:t>Art assets</a:t>
+            </a:r>
+          </a:p>
+          <a:p>
+            <a:pPr lvl="1"/>
+            <a:r>
+              <a:rPr lang="en-US" dirty="0" smtClean="0"/>
+              <a:t>Character design</a:t>
+            </a:r>
+          </a:p>
+          <a:p>
+            <a:pPr lvl="1"/>
+            <a:r>
+              <a:rPr lang="en-US" dirty="0" smtClean="0"/>
+              <a:t>Logo design</a:t>
+            </a:r>
+          </a:p>
+        </p:txBody>
+      </p:sp>
+    </p:spTree>
+  </p:cSld>
+  <p:clrMapOvr>
+    <a:masterClrMapping/>
+  </p:clrMapOvr>
+</p:sld>
+</file>
+
+<file path=ppt/slides/slide7.xml><?xml version="1.0" encoding="utf-8"?>
+<p:sld xmlns:a="http://schemas.openxmlformats.org/drawingml/2006/main" xmlns:r="http://schemas.openxmlformats.org/officeDocument/2006/relationships" xmlns:p="http://schemas.openxmlformats.org/presentationml/2006/main">
+  <p:cSld>
+    <p:spTree>
+      <p:nvGrpSpPr>
+        <p:cNvPr id="1" name=""/>
+        <p:cNvGrpSpPr/>
+        <p:nvPr/>
+      </p:nvGrpSpPr>
+      <p:grpSpPr>
+        <a:xfrm>
+          <a:off x="0" y="0"/>
+          <a:ext cx="0" cy="0"/>
+          <a:chOff x="0" y="0"/>
+          <a:chExt cx="0" cy="0"/>
+        </a:xfrm>
+      </p:grpSpPr>
+      <p:pic>
+        <p:nvPicPr>
+          <p:cNvPr id="4" name="Picture 2"/>
+          <p:cNvPicPr>
+            <a:picLocks noChangeAspect="1" noChangeArrowheads="1"/>
+          </p:cNvPicPr>
+          <p:nvPr/>
+        </p:nvPicPr>
+        <p:blipFill>
+          <a:blip r:embed="rId3" cstate="print"/>
+          <a:srcRect/>
+          <a:stretch>
+            <a:fillRect/>
+          </a:stretch>
+        </p:blipFill>
+        <p:spPr bwMode="auto">
+          <a:xfrm>
+            <a:off x="-4763" y="-1588"/>
+            <a:ext cx="9153526" cy="6867526"/>
+          </a:xfrm>
+          <a:prstGeom prst="rect">
+            <a:avLst/>
+          </a:prstGeom>
+          <a:noFill/>
+          <a:ln w="9525">
+            <a:noFill/>
+            <a:miter lim="800000"/>
+            <a:headEnd/>
+            <a:tailEnd/>
+          </a:ln>
+          <a:effectLst/>
+        </p:spPr>
+      </p:pic>
+      <p:sp>
+        <p:nvSpPr>
+          <p:cNvPr id="2" name="Title 1"/>
+          <p:cNvSpPr>
+            <a:spLocks noGrp="1"/>
+          </p:cNvSpPr>
+          <p:nvPr>
+            <p:ph type="title"/>
+          </p:nvPr>
+        </p:nvSpPr>
+        <p:spPr/>
+        <p:txBody>
+          <a:bodyPr/>
+          <a:lstStyle/>
+          <a:p>
+            <a:r>
+              <a:rPr lang="en-US" dirty="0" smtClean="0"/>
+              <a:t>Art Samples</a:t>
+            </a:r>
+            <a:endParaRPr lang="en-US" dirty="0"/>
+          </a:p>
+        </p:txBody>
+      </p:sp>
+      <p:sp>
+        <p:nvSpPr>
+          <p:cNvPr id="3" name="Content Placeholder 2"/>
+          <p:cNvSpPr>
+            <a:spLocks noGrp="1"/>
+          </p:cNvSpPr>
+          <p:nvPr>
+            <p:ph idx="1"/>
+          </p:nvPr>
+        </p:nvSpPr>
+        <p:spPr/>
+        <p:txBody>
+          <a:bodyPr/>
+          <a:lstStyle/>
+          <a:p>
+            <a:endParaRPr lang="en-US" dirty="0"/>
+          </a:p>
+        </p:txBody>
+      </p:sp>
+      <p:pic>
+        <p:nvPicPr>
+          <p:cNvPr id="1026" name="Picture 2" descr="C:\Users\Craig\Documents\Ayee\Pilot Uncompiled\game\images\New images\female2.png"/>
+          <p:cNvPicPr>
+            <a:picLocks noChangeAspect="1" noChangeArrowheads="1"/>
+          </p:cNvPicPr>
+          <p:nvPr/>
+        </p:nvPicPr>
+        <p:blipFill>
+          <a:blip r:embed="rId4" cstate="print"/>
+          <a:srcRect/>
+          <a:stretch>
+            <a:fillRect/>
+          </a:stretch>
+        </p:blipFill>
+        <p:spPr bwMode="auto">
+          <a:xfrm>
+            <a:off x="0" y="1600200"/>
+            <a:ext cx="5334000" cy="6519334"/>
           </a:xfrm>
           <a:prstGeom prst="rect">
             <a:avLst/>
@@ -6312,100 +7485,162 @@
           <a:noFill/>
         </p:spPr>
       </p:pic>
-      <p:sp>
-        <p:nvSpPr>
-          <p:cNvPr id="2" name="Title 1"/>
-          <p:cNvSpPr>
-            <a:spLocks noGrp="1"/>
-          </p:cNvSpPr>
-          <p:nvPr>
-            <p:ph type="title"/>
-          </p:nvPr>
-        </p:nvSpPr>
-        <p:spPr/>
-        <p:txBody>
-          <a:bodyPr/>
-          <a:lstStyle/>
-          <a:p>
-            <a:r>
-              <a:rPr lang="en-US" dirty="0" smtClean="0"/>
-              <a:t>What’s in Store for </a:t>
-            </a:r>
-            <a:r>
-              <a:rPr lang="en-US" dirty="0" err="1" smtClean="0"/>
-              <a:t>WPIn</a:t>
-            </a:r>
-            <a:r>
-              <a:rPr lang="en-US" dirty="0" smtClean="0"/>
-              <a:t> Love</a:t>
-            </a:r>
-            <a:endParaRPr lang="en-US" dirty="0"/>
-          </a:p>
-        </p:txBody>
-      </p:sp>
-      <p:sp>
-        <p:nvSpPr>
-          <p:cNvPr id="3" name="Content Placeholder 2"/>
-          <p:cNvSpPr>
-            <a:spLocks noGrp="1"/>
-          </p:cNvSpPr>
-          <p:nvPr>
-            <p:ph idx="1"/>
-          </p:nvPr>
-        </p:nvSpPr>
-        <p:spPr/>
-        <p:txBody>
-          <a:bodyPr/>
-          <a:lstStyle/>
-          <a:p>
-            <a:r>
-              <a:rPr lang="en-US" dirty="0" smtClean="0"/>
-              <a:t>Breaking from the default</a:t>
-            </a:r>
-          </a:p>
-          <a:p>
-            <a:pPr lvl="1"/>
-            <a:r>
-              <a:rPr lang="en-US" dirty="0" smtClean="0"/>
-              <a:t>Font</a:t>
-            </a:r>
-          </a:p>
-          <a:p>
-            <a:pPr lvl="1"/>
-            <a:r>
-              <a:rPr lang="en-US" dirty="0" smtClean="0"/>
-              <a:t>Music</a:t>
-            </a:r>
-          </a:p>
-          <a:p>
-            <a:r>
-              <a:rPr lang="en-US" dirty="0" smtClean="0"/>
-              <a:t>Adding special effects</a:t>
-            </a:r>
-          </a:p>
-          <a:p>
-            <a:pPr lvl="1"/>
-            <a:endParaRPr lang="en-US" dirty="0"/>
-          </a:p>
-        </p:txBody>
-      </p:sp>
+      <p:pic>
+        <p:nvPicPr>
+          <p:cNvPr id="1027" name="Picture 3"/>
+          <p:cNvPicPr>
+            <a:picLocks noChangeAspect="1" noChangeArrowheads="1"/>
+          </p:cNvPicPr>
+          <p:nvPr/>
+        </p:nvPicPr>
+        <p:blipFill>
+          <a:blip r:embed="rId5" cstate="print"/>
+          <a:srcRect/>
+          <a:stretch>
+            <a:fillRect/>
+          </a:stretch>
+        </p:blipFill>
+        <p:spPr bwMode="auto">
+          <a:xfrm>
+            <a:off x="3487660" y="1600200"/>
+            <a:ext cx="5656340" cy="6913563"/>
+          </a:xfrm>
+          <a:prstGeom prst="rect">
+            <a:avLst/>
+          </a:prstGeom>
+          <a:noFill/>
+          <a:ln w="9525">
+            <a:noFill/>
+            <a:miter lim="800000"/>
+            <a:headEnd/>
+            <a:tailEnd/>
+          </a:ln>
+        </p:spPr>
+      </p:pic>
     </p:spTree>
   </p:cSld>
   <p:clrMapOvr>
     <a:masterClrMapping/>
   </p:clrMapOvr>
-  <p:transition spd="slow"/>
-  <p:timing>
-    <p:tnLst>
-      <p:par>
-        <p:cTn id="1" dur="indefinite" restart="never" nodeType="tmRoot"/>
-      </p:par>
-    </p:tnLst>
-  </p:timing>
 </p:sld>
 </file>
 
-<file path=ppt/slides/slide4.xml><?xml version="1.0" encoding="utf-8"?>
+<file path=ppt/slides/slide8.xml><?xml version="1.0" encoding="utf-8"?>
+<p:sld xmlns:a="http://schemas.openxmlformats.org/drawingml/2006/main" xmlns:r="http://schemas.openxmlformats.org/officeDocument/2006/relationships" xmlns:p="http://schemas.openxmlformats.org/presentationml/2006/main">
+  <p:cSld>
+    <p:spTree>
+      <p:nvGrpSpPr>
+        <p:cNvPr id="1" name=""/>
+        <p:cNvGrpSpPr/>
+        <p:nvPr/>
+      </p:nvGrpSpPr>
+      <p:grpSpPr>
+        <a:xfrm>
+          <a:off x="0" y="0"/>
+          <a:ext cx="0" cy="0"/>
+          <a:chOff x="0" y="0"/>
+          <a:chExt cx="0" cy="0"/>
+        </a:xfrm>
+      </p:grpSpPr>
+      <p:pic>
+        <p:nvPicPr>
+          <p:cNvPr id="2050" name="Picture 2"/>
+          <p:cNvPicPr>
+            <a:picLocks noChangeAspect="1" noChangeArrowheads="1"/>
+          </p:cNvPicPr>
+          <p:nvPr/>
+        </p:nvPicPr>
+        <p:blipFill>
+          <a:blip r:embed="rId2" cstate="print"/>
+          <a:srcRect/>
+          <a:stretch>
+            <a:fillRect/>
+          </a:stretch>
+        </p:blipFill>
+        <p:spPr bwMode="auto">
+          <a:xfrm>
+            <a:off x="-4763" y="-1588"/>
+            <a:ext cx="9153526" cy="6867526"/>
+          </a:xfrm>
+          <a:prstGeom prst="rect">
+            <a:avLst/>
+          </a:prstGeom>
+          <a:noFill/>
+          <a:ln w="9525">
+            <a:noFill/>
+            <a:miter lim="800000"/>
+            <a:headEnd/>
+            <a:tailEnd/>
+          </a:ln>
+          <a:effectLst/>
+        </p:spPr>
+      </p:pic>
+      <p:sp>
+        <p:nvSpPr>
+          <p:cNvPr id="2" name="Title 1"/>
+          <p:cNvSpPr>
+            <a:spLocks noGrp="1"/>
+          </p:cNvSpPr>
+          <p:nvPr>
+            <p:ph type="title"/>
+          </p:nvPr>
+        </p:nvSpPr>
+        <p:spPr/>
+        <p:txBody>
+          <a:bodyPr/>
+          <a:lstStyle/>
+          <a:p>
+            <a:r>
+              <a:rPr lang="en-US" dirty="0" smtClean="0"/>
+              <a:t>Title Screen; Scene 1</a:t>
+            </a:r>
+            <a:endParaRPr lang="en-US" dirty="0"/>
+          </a:p>
+        </p:txBody>
+      </p:sp>
+      <p:sp>
+        <p:nvSpPr>
+          <p:cNvPr id="3" name="Content Placeholder 2"/>
+          <p:cNvSpPr>
+            <a:spLocks noGrp="1"/>
+          </p:cNvSpPr>
+          <p:nvPr>
+            <p:ph idx="1"/>
+          </p:nvPr>
+        </p:nvSpPr>
+        <p:spPr/>
+        <p:txBody>
+          <a:bodyPr>
+            <a:normAutofit/>
+          </a:bodyPr>
+          <a:lstStyle/>
+          <a:p>
+            <a:pPr>
+              <a:buNone/>
+            </a:pPr>
+            <a:endParaRPr lang="en-US" sz="4400" dirty="0" smtClean="0"/>
+          </a:p>
+          <a:p>
+            <a:pPr>
+              <a:buNone/>
+            </a:pPr>
+            <a:r>
+              <a:rPr lang="en-US" sz="9600" dirty="0" smtClean="0"/>
+              <a:t>Game Samples!</a:t>
+            </a:r>
+            <a:endParaRPr lang="en-US" sz="9600" dirty="0"/>
+          </a:p>
+        </p:txBody>
+      </p:sp>
+    </p:spTree>
+  </p:cSld>
+  <p:clrMapOvr>
+    <a:masterClrMapping/>
+  </p:clrMapOvr>
+</p:sld>
+</file>
+
+<file path=ppt/slides/slide9.xml><?xml version="1.0" encoding="utf-8"?>
 <p:sld xmlns:a="http://schemas.openxmlformats.org/drawingml/2006/main" xmlns:r="http://schemas.openxmlformats.org/officeDocument/2006/relationships" xmlns:p="http://schemas.openxmlformats.org/presentationml/2006/main">
   <p:cSld>
     <p:spTree>
@@ -6473,7 +7708,15 @@
           <a:p>
             <a:r>
               <a:rPr lang="en-US" dirty="0" smtClean="0"/>
-              <a:t>What to cut?</a:t>
+              <a:t>What’s in Store for </a:t>
+            </a:r>
+            <a:r>
+              <a:rPr lang="en-US" dirty="0" err="1" smtClean="0"/>
+              <a:t>WPIn</a:t>
+            </a:r>
+            <a:r>
+              <a:rPr lang="en-US" dirty="0" smtClean="0"/>
+              <a:t> Love</a:t>
             </a:r>
             <a:endParaRPr lang="en-US" dirty="0"/>
           </a:p>
@@ -6494,48 +7737,53 @@
           <a:bodyPr/>
           <a:lstStyle/>
           <a:p>
-            <a:pPr>
-              <a:buNone/>
-            </a:pPr>
             <a:r>
               <a:rPr lang="en-US" dirty="0" smtClean="0"/>
-              <a:t>The most dispensable aspects</a:t>
-            </a:r>
-          </a:p>
-          <a:p>
-            <a:pPr>
-              <a:buNone/>
-            </a:pPr>
+              <a:t>Breaking from the default</a:t>
+            </a:r>
+          </a:p>
+          <a:p>
+            <a:pPr lvl="1"/>
             <a:r>
               <a:rPr lang="en-US" dirty="0" smtClean="0"/>
-              <a:t>of the game, in order:</a:t>
-            </a:r>
-          </a:p>
-          <a:p>
-            <a:pPr marL="514350" indent="-514350">
-              <a:buFont typeface="+mj-lt"/>
-              <a:buAutoNum type="arabicPeriod"/>
-            </a:pPr>
+              <a:t>Font</a:t>
+            </a:r>
+          </a:p>
+          <a:p>
+            <a:pPr lvl="1"/>
             <a:r>
               <a:rPr lang="en-US" dirty="0" smtClean="0"/>
-              <a:t>Large chunks of dialogue (e.g. professor’s speech, dinner conversation)</a:t>
-            </a:r>
-          </a:p>
-          <a:p>
-            <a:pPr marL="514350" indent="-514350">
-              <a:buFont typeface="+mj-lt"/>
-              <a:buAutoNum type="arabicPeriod"/>
-            </a:pPr>
+              <a:t>Music</a:t>
+            </a:r>
+          </a:p>
+          <a:p>
             <a:r>
               <a:rPr lang="en-US" dirty="0" smtClean="0"/>
-              <a:t>One emotion asset per character</a:t>
-            </a:r>
-          </a:p>
-          <a:p>
-            <a:pPr marL="514350" indent="-514350">
-              <a:buFont typeface="+mj-lt"/>
-              <a:buAutoNum type="arabicPeriod"/>
-            </a:pPr>
+              <a:t>Adding more special effects</a:t>
+            </a:r>
+          </a:p>
+          <a:p>
+            <a:pPr lvl="1"/>
+            <a:r>
+              <a:rPr lang="en-US" dirty="0" smtClean="0"/>
+              <a:t>Visual</a:t>
+            </a:r>
+          </a:p>
+          <a:p>
+            <a:pPr lvl="1"/>
+            <a:r>
+              <a:rPr lang="en-US" dirty="0" smtClean="0"/>
+              <a:t>Sound</a:t>
+            </a:r>
+          </a:p>
+          <a:p>
+            <a:r>
+              <a:rPr lang="en-US" dirty="0" smtClean="0"/>
+              <a:t>Voice acting</a:t>
+            </a:r>
+          </a:p>
+          <a:p>
+            <a:pPr lvl="1"/>
             <a:endParaRPr lang="en-US" dirty="0"/>
           </a:p>
         </p:txBody>
@@ -6545,6 +7793,7 @@
   <p:clrMapOvr>
     <a:masterClrMapping/>
   </p:clrMapOvr>
+  <p:transition spd="slow"/>
   <p:timing>
     <p:tnLst>
       <p:par>
@@ -6836,4 +8085,287 @@
   <a:objectDefaults/>
   <a:extraClrSchemeLst/>
 </a:theme>
+</file>
+
+<file path=ppt/theme/theme2.xml><?xml version="1.0" encoding="utf-8"?>
+<a:theme xmlns:a="http://schemas.openxmlformats.org/drawingml/2006/main" name="Office Theme">
+  <a:themeElements>
+    <a:clrScheme name="Office">
+      <a:dk1>
+        <a:sysClr val="windowText" lastClr="000000"/>
+      </a:dk1>
+      <a:lt1>
+        <a:sysClr val="window" lastClr="FFFFFF"/>
+      </a:lt1>
+      <a:dk2>
+        <a:srgbClr val="1F497D"/>
+      </a:dk2>
+      <a:lt2>
+        <a:srgbClr val="EEECE1"/>
+      </a:lt2>
+      <a:accent1>
+        <a:srgbClr val="4F81BD"/>
+      </a:accent1>
+      <a:accent2>
+        <a:srgbClr val="C0504D"/>
+      </a:accent2>
+      <a:accent3>
+        <a:srgbClr val="9BBB59"/>
+      </a:accent3>
+      <a:accent4>
+        <a:srgbClr val="8064A2"/>
+      </a:accent4>
+      <a:accent5>
+        <a:srgbClr val="4BACC6"/>
+      </a:accent5>
+      <a:accent6>
+        <a:srgbClr val="F79646"/>
+      </a:accent6>
+      <a:hlink>
+        <a:srgbClr val="0000FF"/>
+      </a:hlink>
+      <a:folHlink>
+        <a:srgbClr val="800080"/>
+      </a:folHlink>
+    </a:clrScheme>
+    <a:fontScheme name="Office">
+      <a:majorFont>
+        <a:latin typeface="Calibri"/>
+        <a:ea typeface=""/>
+        <a:cs typeface=""/>
+        <a:font script="Jpan" typeface="ＭＳ Ｐゴシック"/>
+        <a:font script="Hang" typeface="맑은 고딕"/>
+        <a:font script="Hans" typeface="宋体"/>
+        <a:font script="Hant" typeface="新細明體"/>
+        <a:font script="Arab" typeface="Times New Roman"/>
+        <a:font script="Hebr" typeface="Times New Roman"/>
+        <a:font script="Thai" typeface="Angsana New"/>
+        <a:font script="Ethi" typeface="Nyala"/>
+        <a:font script="Beng" typeface="Vrinda"/>
+        <a:font script="Gujr" typeface="Shruti"/>
+        <a:font script="Khmr" typeface="MoolBoran"/>
+        <a:font script="Knda" typeface="Tunga"/>
+        <a:font script="Guru" typeface="Raavi"/>
+        <a:font script="Cans" typeface="Euphemia"/>
+        <a:font script="Cher" typeface="Plantagenet Cherokee"/>
+        <a:font script="Yiii" typeface="Microsoft Yi Baiti"/>
+        <a:font script="Tibt" typeface="Microsoft Himalaya"/>
+        <a:font script="Thaa" typeface="MV Boli"/>
+        <a:font script="Deva" typeface="Mangal"/>
+        <a:font script="Telu" typeface="Gautami"/>
+        <a:font script="Taml" typeface="Latha"/>
+        <a:font script="Syrc" typeface="Estrangelo Edessa"/>
+        <a:font script="Orya" typeface="Kalinga"/>
+        <a:font script="Mlym" typeface="Kartika"/>
+        <a:font script="Laoo" typeface="DokChampa"/>
+        <a:font script="Sinh" typeface="Iskoola Pota"/>
+        <a:font script="Mong" typeface="Mongolian Baiti"/>
+        <a:font script="Viet" typeface="Times New Roman"/>
+        <a:font script="Uigh" typeface="Microsoft Uighur"/>
+      </a:majorFont>
+      <a:minorFont>
+        <a:latin typeface="Calibri"/>
+        <a:ea typeface=""/>
+        <a:cs typeface=""/>
+        <a:font script="Jpan" typeface="ＭＳ Ｐゴシック"/>
+        <a:font script="Hang" typeface="맑은 고딕"/>
+        <a:font script="Hans" typeface="宋体"/>
+        <a:font script="Hant" typeface="新細明體"/>
+        <a:font script="Arab" typeface="Arial"/>
+        <a:font script="Hebr" typeface="Arial"/>
+        <a:font script="Thai" typeface="Cordia New"/>
+        <a:font script="Ethi" typeface="Nyala"/>
+        <a:font script="Beng" typeface="Vrinda"/>
+        <a:font script="Gujr" typeface="Shruti"/>
+        <a:font script="Khmr" typeface="DaunPenh"/>
+        <a:font script="Knda" typeface="Tunga"/>
+        <a:font script="Guru" typeface="Raavi"/>
+        <a:font script="Cans" typeface="Euphemia"/>
+        <a:font script="Cher" typeface="Plantagenet Cherokee"/>
+        <a:font script="Yiii" typeface="Microsoft Yi Baiti"/>
+        <a:font script="Tibt" typeface="Microsoft Himalaya"/>
+        <a:font script="Thaa" typeface="MV Boli"/>
+        <a:font script="Deva" typeface="Mangal"/>
+        <a:font script="Telu" typeface="Gautami"/>
+        <a:font script="Taml" typeface="Latha"/>
+        <a:font script="Syrc" typeface="Estrangelo Edessa"/>
+        <a:font script="Orya" typeface="Kalinga"/>
+        <a:font script="Mlym" typeface="Kartika"/>
+        <a:font script="Laoo" typeface="DokChampa"/>
+        <a:font script="Sinh" typeface="Iskoola Pota"/>
+        <a:font script="Mong" typeface="Mongolian Baiti"/>
+        <a:font script="Viet" typeface="Arial"/>
+        <a:font script="Uigh" typeface="Microsoft Uighur"/>
+      </a:minorFont>
+    </a:fontScheme>
+    <a:fmtScheme name="Office">
+      <a:fillStyleLst>
+        <a:solidFill>
+          <a:schemeClr val="phClr"/>
+        </a:solidFill>
+        <a:gradFill rotWithShape="1">
+          <a:gsLst>
+            <a:gs pos="0">
+              <a:schemeClr val="phClr">
+                <a:tint val="50000"/>
+                <a:satMod val="300000"/>
+              </a:schemeClr>
+            </a:gs>
+            <a:gs pos="35000">
+              <a:schemeClr val="phClr">
+                <a:tint val="37000"/>
+                <a:satMod val="300000"/>
+              </a:schemeClr>
+            </a:gs>
+            <a:gs pos="100000">
+              <a:schemeClr val="phClr">
+                <a:tint val="15000"/>
+                <a:satMod val="350000"/>
+              </a:schemeClr>
+            </a:gs>
+          </a:gsLst>
+          <a:lin ang="16200000" scaled="1"/>
+        </a:gradFill>
+        <a:gradFill rotWithShape="1">
+          <a:gsLst>
+            <a:gs pos="0">
+              <a:schemeClr val="phClr">
+                <a:shade val="51000"/>
+                <a:satMod val="130000"/>
+              </a:schemeClr>
+            </a:gs>
+            <a:gs pos="80000">
+              <a:schemeClr val="phClr">
+                <a:shade val="93000"/>
+                <a:satMod val="130000"/>
+              </a:schemeClr>
+            </a:gs>
+            <a:gs pos="100000">
+              <a:schemeClr val="phClr">
+                <a:shade val="94000"/>
+                <a:satMod val="135000"/>
+              </a:schemeClr>
+            </a:gs>
+          </a:gsLst>
+          <a:lin ang="16200000" scaled="0"/>
+        </a:gradFill>
+      </a:fillStyleLst>
+      <a:lnStyleLst>
+        <a:ln w="9525" cap="flat" cmpd="sng" algn="ctr">
+          <a:solidFill>
+            <a:schemeClr val="phClr">
+              <a:shade val="95000"/>
+              <a:satMod val="105000"/>
+            </a:schemeClr>
+          </a:solidFill>
+          <a:prstDash val="solid"/>
+        </a:ln>
+        <a:ln w="25400" cap="flat" cmpd="sng" algn="ctr">
+          <a:solidFill>
+            <a:schemeClr val="phClr"/>
+          </a:solidFill>
+          <a:prstDash val="solid"/>
+        </a:ln>
+        <a:ln w="38100" cap="flat" cmpd="sng" algn="ctr">
+          <a:solidFill>
+            <a:schemeClr val="phClr"/>
+          </a:solidFill>
+          <a:prstDash val="solid"/>
+        </a:ln>
+      </a:lnStyleLst>
+      <a:effectStyleLst>
+        <a:effectStyle>
+          <a:effectLst>
+            <a:outerShdw blurRad="40000" dist="20000" dir="5400000" rotWithShape="0">
+              <a:srgbClr val="000000">
+                <a:alpha val="38000"/>
+              </a:srgbClr>
+            </a:outerShdw>
+          </a:effectLst>
+        </a:effectStyle>
+        <a:effectStyle>
+          <a:effectLst>
+            <a:outerShdw blurRad="40000" dist="23000" dir="5400000" rotWithShape="0">
+              <a:srgbClr val="000000">
+                <a:alpha val="35000"/>
+              </a:srgbClr>
+            </a:outerShdw>
+          </a:effectLst>
+        </a:effectStyle>
+        <a:effectStyle>
+          <a:effectLst>
+            <a:outerShdw blurRad="40000" dist="23000" dir="5400000" rotWithShape="0">
+              <a:srgbClr val="000000">
+                <a:alpha val="35000"/>
+              </a:srgbClr>
+            </a:outerShdw>
+          </a:effectLst>
+          <a:scene3d>
+            <a:camera prst="orthographicFront">
+              <a:rot lat="0" lon="0" rev="0"/>
+            </a:camera>
+            <a:lightRig rig="threePt" dir="t">
+              <a:rot lat="0" lon="0" rev="1200000"/>
+            </a:lightRig>
+          </a:scene3d>
+          <a:sp3d>
+            <a:bevelT w="63500" h="25400"/>
+          </a:sp3d>
+        </a:effectStyle>
+      </a:effectStyleLst>
+      <a:bgFillStyleLst>
+        <a:solidFill>
+          <a:schemeClr val="phClr"/>
+        </a:solidFill>
+        <a:gradFill rotWithShape="1">
+          <a:gsLst>
+            <a:gs pos="0">
+              <a:schemeClr val="phClr">
+                <a:tint val="40000"/>
+                <a:satMod val="350000"/>
+              </a:schemeClr>
+            </a:gs>
+            <a:gs pos="40000">
+              <a:schemeClr val="phClr">
+                <a:tint val="45000"/>
+                <a:shade val="99000"/>
+                <a:satMod val="350000"/>
+              </a:schemeClr>
+            </a:gs>
+            <a:gs pos="100000">
+              <a:schemeClr val="phClr">
+                <a:shade val="20000"/>
+                <a:satMod val="255000"/>
+              </a:schemeClr>
+            </a:gs>
+          </a:gsLst>
+          <a:path path="circle">
+            <a:fillToRect l="50000" t="-80000" r="50000" b="180000"/>
+          </a:path>
+        </a:gradFill>
+        <a:gradFill rotWithShape="1">
+          <a:gsLst>
+            <a:gs pos="0">
+              <a:schemeClr val="phClr">
+                <a:tint val="80000"/>
+                <a:satMod val="300000"/>
+              </a:schemeClr>
+            </a:gs>
+            <a:gs pos="100000">
+              <a:schemeClr val="phClr">
+                <a:shade val="30000"/>
+                <a:satMod val="200000"/>
+              </a:schemeClr>
+            </a:gs>
+          </a:gsLst>
+          <a:path path="circle">
+            <a:fillToRect l="50000" t="50000" r="50000" b="50000"/>
+          </a:path>
+        </a:gradFill>
+      </a:bgFillStyleLst>
+    </a:fmtScheme>
+  </a:themeElements>
+  <a:objectDefaults/>
+  <a:extraClrSchemeLst/>
+</a:theme>
 </file>
</xml_diff>

<commit_message>
The actual final version of the power point, with minor tweaks
</commit_message>
<xml_diff>
--- a/WPIn Love, Status Update.pptx
+++ b/WPIn Love, Status Update.pptx
@@ -2892,6 +2892,7 @@
           <a:p>
             <a:fld id="{5F982C7F-4FB8-40C3-8B14-83B7E5C25AA4}" type="datetimeFigureOut">
               <a:rPr lang="en-US" smtClean="0"/>
+              <a:pPr/>
               <a:t>10/1/2015</a:t>
             </a:fld>
             <a:endParaRPr lang="en-US"/>
@@ -3053,6 +3054,7 @@
           <a:p>
             <a:fld id="{FEC87844-D84E-46D3-AB17-761241C088D1}" type="slidenum">
               <a:rPr lang="en-US" smtClean="0"/>
+              <a:pPr/>
               <a:t>‹#›</a:t>
             </a:fld>
             <a:endParaRPr lang="en-US"/>
@@ -3224,6 +3226,7 @@
           <a:p>
             <a:fld id="{FEC87844-D84E-46D3-AB17-761241C088D1}" type="slidenum">
               <a:rPr lang="en-US" smtClean="0"/>
+              <a:pPr/>
               <a:t>7</a:t>
             </a:fld>
             <a:endParaRPr lang="en-US"/>
@@ -6247,7 +6250,33 @@
                 </a:solidFill>
                 <a:latin typeface="Garamond" pitchFamily="18" charset="0"/>
               </a:rPr>
-              <a:t> Love, Status Update</a:t>
+              <a:t> Love, Status </a:t>
+            </a:r>
+            <a:r>
+              <a:rPr lang="en-US" b="1" dirty="0" smtClean="0">
+                <a:solidFill>
+                  <a:schemeClr val="bg1"/>
+                </a:solidFill>
+                <a:latin typeface="Garamond" pitchFamily="18" charset="0"/>
+              </a:rPr>
+              <a:t>Update</a:t>
+            </a:r>
+            <a:br>
+              <a:rPr lang="en-US" b="1" dirty="0" smtClean="0">
+                <a:solidFill>
+                  <a:schemeClr val="bg1"/>
+                </a:solidFill>
+                <a:latin typeface="Garamond" pitchFamily="18" charset="0"/>
+              </a:rPr>
+            </a:br>
+            <a:r>
+              <a:rPr lang="en-US" b="1" dirty="0" smtClean="0">
+                <a:solidFill>
+                  <a:schemeClr val="bg1"/>
+                </a:solidFill>
+                <a:latin typeface="Garamond" pitchFamily="18" charset="0"/>
+              </a:rPr>
+              <a:t>Spell Shaded</a:t>
             </a:r>
             <a:endParaRPr lang="en-US" b="1" dirty="0">
               <a:solidFill>
@@ -6711,7 +6740,24 @@
             </a:pPr>
             <a:r>
               <a:rPr lang="en-US" dirty="0" smtClean="0"/>
-              <a:t>The most dispensable aspects of the game, in order:</a:t>
+              <a:t>The most dispensable </a:t>
+            </a:r>
+            <a:r>
+              <a:rPr lang="en-US" dirty="0" smtClean="0"/>
+              <a:t>aspects</a:t>
+            </a:r>
+          </a:p>
+          <a:p>
+            <a:pPr>
+              <a:buNone/>
+            </a:pPr>
+            <a:r>
+              <a:rPr lang="en-US" dirty="0" smtClean="0"/>
+              <a:t>of </a:t>
+            </a:r>
+            <a:r>
+              <a:rPr lang="en-US" dirty="0" smtClean="0"/>
+              <a:t>the game, in order:</a:t>
             </a:r>
           </a:p>
           <a:p>
@@ -6753,6 +6799,32 @@
           </a:p>
         </p:txBody>
       </p:sp>
+      <p:pic>
+        <p:nvPicPr>
+          <p:cNvPr id="1026" name="Picture 2" descr="http://www.wpclipart.com/tools/scissors/scissors_2/scissors_clip_art.png"/>
+          <p:cNvPicPr>
+            <a:picLocks noChangeAspect="1" noChangeArrowheads="1"/>
+          </p:cNvPicPr>
+          <p:nvPr/>
+        </p:nvPicPr>
+        <p:blipFill>
+          <a:blip r:embed="rId3" cstate="print"/>
+          <a:srcRect/>
+          <a:stretch>
+            <a:fillRect/>
+          </a:stretch>
+        </p:blipFill>
+        <p:spPr bwMode="auto">
+          <a:xfrm>
+            <a:off x="7010400" y="117215"/>
+            <a:ext cx="1981200" cy="2244985"/>
+          </a:xfrm>
+          <a:prstGeom prst="rect">
+            <a:avLst/>
+          </a:prstGeom>
+          <a:noFill/>
+        </p:spPr>
+      </p:pic>
     </p:spTree>
   </p:cSld>
   <p:clrMapOvr>
@@ -7354,7 +7426,18 @@
             <a:pPr lvl="1"/>
             <a:r>
               <a:rPr lang="en-US" dirty="0" smtClean="0"/>
-              <a:t>Logo design</a:t>
+              <a:t>Logo </a:t>
+            </a:r>
+            <a:r>
+              <a:rPr lang="en-US" dirty="0" smtClean="0"/>
+              <a:t>design</a:t>
+            </a:r>
+            <a:endParaRPr lang="en-US" dirty="0" smtClean="0"/>
+          </a:p>
+          <a:p>
+            <a:r>
+              <a:rPr lang="en-US" dirty="0" smtClean="0"/>
+              <a:t>Virtual art conversion</a:t>
             </a:r>
           </a:p>
         </p:txBody>

</xml_diff>

<commit_message>
Fixed Jimmy's slide after rehearsing
</commit_message>
<xml_diff>
--- a/WPIn Love, Status Update.pptx
+++ b/WPIn Love, Status Update.pptx
@@ -6250,16 +6250,7 @@
                 </a:solidFill>
                 <a:latin typeface="Garamond" pitchFamily="18" charset="0"/>
               </a:rPr>
-              <a:t> Love, Status </a:t>
-            </a:r>
-            <a:r>
-              <a:rPr lang="en-US" b="1" dirty="0" smtClean="0">
-                <a:solidFill>
-                  <a:schemeClr val="bg1"/>
-                </a:solidFill>
-                <a:latin typeface="Garamond" pitchFamily="18" charset="0"/>
-              </a:rPr>
-              <a:t>Update</a:t>
+              <a:t> Love, Status Update</a:t>
             </a:r>
             <a:br>
               <a:rPr lang="en-US" b="1" dirty="0" smtClean="0">
@@ -6740,11 +6731,7 @@
             </a:pPr>
             <a:r>
               <a:rPr lang="en-US" dirty="0" smtClean="0"/>
-              <a:t>The most dispensable </a:t>
-            </a:r>
-            <a:r>
-              <a:rPr lang="en-US" dirty="0" smtClean="0"/>
-              <a:t>aspects</a:t>
+              <a:t>The most dispensable aspects</a:t>
             </a:r>
           </a:p>
           <a:p>
@@ -6753,11 +6740,7 @@
             </a:pPr>
             <a:r>
               <a:rPr lang="en-US" dirty="0" smtClean="0"/>
-              <a:t>of </a:t>
-            </a:r>
-            <a:r>
-              <a:rPr lang="en-US" dirty="0" smtClean="0"/>
-              <a:t>the game, in order:</a:t>
+              <a:t>of the game, in order:</a:t>
             </a:r>
           </a:p>
           <a:p>
@@ -7157,8 +7140,15 @@
           <a:p>
             <a:r>
               <a:rPr lang="en-US" dirty="0" smtClean="0"/>
-              <a:t>Placeholder</a:t>
-            </a:r>
+              <a:t>Wiring game together</a:t>
+            </a:r>
+          </a:p>
+          <a:p>
+            <a:r>
+              <a:rPr lang="en-US" dirty="0" smtClean="0"/>
+              <a:t>Placeholders</a:t>
+            </a:r>
+            <a:endParaRPr lang="en-US" dirty="0" smtClean="0"/>
           </a:p>
           <a:p>
             <a:r>
@@ -7426,13 +7416,8 @@
             <a:pPr lvl="1"/>
             <a:r>
               <a:rPr lang="en-US" dirty="0" smtClean="0"/>
-              <a:t>Logo </a:t>
-            </a:r>
-            <a:r>
-              <a:rPr lang="en-US" dirty="0" smtClean="0"/>
-              <a:t>design</a:t>
-            </a:r>
-            <a:endParaRPr lang="en-US" dirty="0" smtClean="0"/>
+              <a:t>Logo design</a:t>
+            </a:r>
           </a:p>
           <a:p>
             <a:r>

</xml_diff>